<commit_message>
Callers2Coders Updated - 6/23/20
</commit_message>
<xml_diff>
--- a/Lectures/(8) Tools for Data Manipulation _ Management.pptx
+++ b/Lectures/(8) Tools for Data Manipulation _ Management.pptx
@@ -23,8 +23,8 @@
     <p:sldId id="269" r:id="rId14"/>
     <p:sldId id="270" r:id="rId15"/>
     <p:sldId id="271" r:id="rId16"/>
-    <p:sldId id="272" r:id="rId17"/>
-    <p:sldId id="274" r:id="rId18"/>
+    <p:sldId id="274" r:id="rId17"/>
+    <p:sldId id="272" r:id="rId18"/>
   </p:sldIdLst>
   <p:sldSz cx="12192000" cy="6858000"/>
   <p:notesSz cx="6858000" cy="9144000"/>
@@ -2461,6 +2461,173 @@
   <p:cSld>
     <p:spTree>
       <p:nvGrpSpPr>
+        <p:cNvPr id="1" name="Shape 307"/>
+        <p:cNvGrpSpPr/>
+        <p:nvPr/>
+      </p:nvGrpSpPr>
+      <p:grpSpPr>
+        <a:xfrm>
+          <a:off x="0" y="0"/>
+          <a:ext cx="0" cy="0"/>
+          <a:chOff x="0" y="0"/>
+          <a:chExt cx="0" cy="0"/>
+        </a:xfrm>
+      </p:grpSpPr>
+      <p:sp>
+        <p:nvSpPr>
+          <p:cNvPr id="308" name="Google Shape;308;g5275e2a24e_0_238:notes"/>
+          <p:cNvSpPr txBox="1">
+            <a:spLocks noGrp="1"/>
+          </p:cNvSpPr>
+          <p:nvPr>
+            <p:ph type="body" idx="1"/>
+          </p:nvPr>
+        </p:nvSpPr>
+        <p:spPr>
+          <a:xfrm>
+            <a:off x="685800" y="4400550"/>
+            <a:ext cx="5486400" cy="3600600"/>
+          </a:xfrm>
+          <a:prstGeom prst="rect">
+            <a:avLst/>
+          </a:prstGeom>
+          <a:noFill/>
+          <a:ln>
+            <a:noFill/>
+          </a:ln>
+        </p:spPr>
+        <p:txBody>
+          <a:bodyPr spcFirstLastPara="1" wrap="square" lIns="91425" tIns="45700" rIns="91425" bIns="45700" anchor="t" anchorCtr="0">
+            <a:noAutofit/>
+          </a:bodyPr>
+          <a:lstStyle/>
+          <a:p>
+            <a:pPr marL="0" marR="0" lvl="0" indent="0" algn="l" rtl="0">
+              <a:lnSpc>
+                <a:spcPct val="100000"/>
+              </a:lnSpc>
+              <a:spcBef>
+                <a:spcPts val="0"/>
+              </a:spcBef>
+              <a:spcAft>
+                <a:spcPts val="0"/>
+              </a:spcAft>
+              <a:buNone/>
+            </a:pPr>
+            <a:r>
+              <a:rPr lang="en-US" dirty="0">
+                <a:latin typeface="Lato"/>
+                <a:ea typeface="Lato"/>
+                <a:cs typeface="Lato"/>
+                <a:sym typeface="Lato"/>
+              </a:rPr>
+              <a:t>Steps at: https://cloud.google.com/sql/docs/mysql/import-export/importing</a:t>
+            </a:r>
+          </a:p>
+          <a:p>
+            <a:pPr marL="0" marR="0" lvl="0" indent="0" algn="l" rtl="0">
+              <a:lnSpc>
+                <a:spcPct val="100000"/>
+              </a:lnSpc>
+              <a:spcBef>
+                <a:spcPts val="0"/>
+              </a:spcBef>
+              <a:spcAft>
+                <a:spcPts val="0"/>
+              </a:spcAft>
+              <a:buNone/>
+            </a:pPr>
+            <a:r>
+              <a:rPr lang="en-US" dirty="0">
+                <a:latin typeface="Lato"/>
+                <a:ea typeface="Lato"/>
+                <a:cs typeface="Lato"/>
+                <a:sym typeface="Lato"/>
+              </a:rPr>
+              <a:t>If “SUPER” access is needed on dump file import to “MySQL” database – create a new database via google cloud </a:t>
+            </a:r>
+            <a:r>
+              <a:rPr lang="en-US" dirty="0" err="1">
+                <a:latin typeface="Lato"/>
+                <a:ea typeface="Lato"/>
+                <a:cs typeface="Lato"/>
+                <a:sym typeface="Lato"/>
+              </a:rPr>
+              <a:t>sql</a:t>
+            </a:r>
+            <a:endParaRPr lang="en-US" dirty="0">
+              <a:latin typeface="Lato"/>
+              <a:ea typeface="Lato"/>
+              <a:cs typeface="Lato"/>
+              <a:sym typeface="Lato"/>
+            </a:endParaRPr>
+          </a:p>
+        </p:txBody>
+      </p:sp>
+      <p:sp>
+        <p:nvSpPr>
+          <p:cNvPr id="309" name="Google Shape;309;g5275e2a24e_0_238:notes"/>
+          <p:cNvSpPr>
+            <a:spLocks noGrp="1" noRot="1" noChangeAspect="1"/>
+          </p:cNvSpPr>
+          <p:nvPr>
+            <p:ph type="sldImg" idx="2"/>
+          </p:nvPr>
+        </p:nvSpPr>
+        <p:spPr>
+          <a:xfrm>
+            <a:off x="685800" y="1143000"/>
+            <a:ext cx="5486400" cy="3086100"/>
+          </a:xfrm>
+          <a:custGeom>
+            <a:avLst/>
+            <a:gdLst/>
+            <a:ahLst/>
+            <a:cxnLst/>
+            <a:rect l="l" t="t" r="r" b="b"/>
+            <a:pathLst>
+              <a:path w="120000" h="120000" extrusionOk="0">
+                <a:moveTo>
+                  <a:pt x="0" y="0"/>
+                </a:moveTo>
+                <a:lnTo>
+                  <a:pt x="120000" y="0"/>
+                </a:lnTo>
+                <a:lnTo>
+                  <a:pt x="120000" y="120000"/>
+                </a:lnTo>
+                <a:lnTo>
+                  <a:pt x="0" y="120000"/>
+                </a:lnTo>
+                <a:close/>
+              </a:path>
+            </a:pathLst>
+          </a:custGeom>
+          <a:noFill/>
+          <a:ln w="12700" cap="flat" cmpd="sng">
+            <a:solidFill>
+              <a:srgbClr val="000000"/>
+            </a:solidFill>
+            <a:prstDash val="solid"/>
+            <a:round/>
+            <a:headEnd type="none" w="sm" len="sm"/>
+            <a:tailEnd type="none" w="sm" len="sm"/>
+          </a:ln>
+        </p:spPr>
+      </p:sp>
+    </p:spTree>
+  </p:cSld>
+  <p:clrMapOvr>
+    <a:masterClrMapping/>
+  </p:clrMapOvr>
+</p:notes>
+</file>
+
+<file path=ppt/notesSlides/notesSlide16.xml><?xml version="1.0" encoding="utf-8"?>
+<p:notes xmlns:a="http://schemas.openxmlformats.org/drawingml/2006/main" xmlns:r="http://schemas.openxmlformats.org/officeDocument/2006/relationships" xmlns:p="http://schemas.openxmlformats.org/presentationml/2006/main" showMasterSp="0" showMasterPhAnim="0">
+  <p:cSld>
+    <p:spTree>
+      <p:nvGrpSpPr>
         <p:cNvPr id="1" name="Shape 292"/>
         <p:cNvGrpSpPr/>
         <p:nvPr/>
@@ -2592,178 +2759,11 @@
             </a:pPr>
             <a:fld id="{00000000-1234-1234-1234-123412341234}" type="slidenum">
               <a:rPr lang="en-US"/>
-              <a:t>15</a:t>
+              <a:t>16</a:t>
             </a:fld>
             <a:endParaRPr/>
           </a:p>
         </p:txBody>
-      </p:sp>
-    </p:spTree>
-  </p:cSld>
-  <p:clrMapOvr>
-    <a:masterClrMapping/>
-  </p:clrMapOvr>
-</p:notes>
-</file>
-
-<file path=ppt/notesSlides/notesSlide16.xml><?xml version="1.0" encoding="utf-8"?>
-<p:notes xmlns:a="http://schemas.openxmlformats.org/drawingml/2006/main" xmlns:r="http://schemas.openxmlformats.org/officeDocument/2006/relationships" xmlns:p="http://schemas.openxmlformats.org/presentationml/2006/main" showMasterSp="0" showMasterPhAnim="0">
-  <p:cSld>
-    <p:spTree>
-      <p:nvGrpSpPr>
-        <p:cNvPr id="1" name="Shape 307"/>
-        <p:cNvGrpSpPr/>
-        <p:nvPr/>
-      </p:nvGrpSpPr>
-      <p:grpSpPr>
-        <a:xfrm>
-          <a:off x="0" y="0"/>
-          <a:ext cx="0" cy="0"/>
-          <a:chOff x="0" y="0"/>
-          <a:chExt cx="0" cy="0"/>
-        </a:xfrm>
-      </p:grpSpPr>
-      <p:sp>
-        <p:nvSpPr>
-          <p:cNvPr id="308" name="Google Shape;308;g5275e2a24e_0_238:notes"/>
-          <p:cNvSpPr txBox="1">
-            <a:spLocks noGrp="1"/>
-          </p:cNvSpPr>
-          <p:nvPr>
-            <p:ph type="body" idx="1"/>
-          </p:nvPr>
-        </p:nvSpPr>
-        <p:spPr>
-          <a:xfrm>
-            <a:off x="685800" y="4400550"/>
-            <a:ext cx="5486400" cy="3600600"/>
-          </a:xfrm>
-          <a:prstGeom prst="rect">
-            <a:avLst/>
-          </a:prstGeom>
-          <a:noFill/>
-          <a:ln>
-            <a:noFill/>
-          </a:ln>
-        </p:spPr>
-        <p:txBody>
-          <a:bodyPr spcFirstLastPara="1" wrap="square" lIns="91425" tIns="45700" rIns="91425" bIns="45700" anchor="t" anchorCtr="0">
-            <a:noAutofit/>
-          </a:bodyPr>
-          <a:lstStyle/>
-          <a:p>
-            <a:pPr marL="0" marR="0" lvl="0" indent="0" algn="l" rtl="0">
-              <a:lnSpc>
-                <a:spcPct val="100000"/>
-              </a:lnSpc>
-              <a:spcBef>
-                <a:spcPts val="0"/>
-              </a:spcBef>
-              <a:spcAft>
-                <a:spcPts val="0"/>
-              </a:spcAft>
-              <a:buNone/>
-            </a:pPr>
-            <a:r>
-              <a:rPr lang="en-US" dirty="0">
-                <a:latin typeface="Lato"/>
-                <a:ea typeface="Lato"/>
-                <a:cs typeface="Lato"/>
-                <a:sym typeface="Lato"/>
-              </a:rPr>
-              <a:t>Steps at: https://cloud.google.com/sql/docs/mysql/import-export/importing</a:t>
-            </a:r>
-          </a:p>
-          <a:p>
-            <a:pPr marL="0" marR="0" lvl="0" indent="0" algn="l" rtl="0">
-              <a:lnSpc>
-                <a:spcPct val="100000"/>
-              </a:lnSpc>
-              <a:spcBef>
-                <a:spcPts val="0"/>
-              </a:spcBef>
-              <a:spcAft>
-                <a:spcPts val="0"/>
-              </a:spcAft>
-              <a:buNone/>
-            </a:pPr>
-            <a:r>
-              <a:rPr lang="en-US" dirty="0">
-                <a:latin typeface="Lato"/>
-                <a:ea typeface="Lato"/>
-                <a:cs typeface="Lato"/>
-                <a:sym typeface="Lato"/>
-              </a:rPr>
-              <a:t>If “SUPER” access is needed on dump file import to “MySQL” database – create a new database via google cloud </a:t>
-            </a:r>
-            <a:r>
-              <a:rPr lang="en-US" dirty="0" err="1">
-                <a:latin typeface="Lato"/>
-                <a:ea typeface="Lato"/>
-                <a:cs typeface="Lato"/>
-                <a:sym typeface="Lato"/>
-              </a:rPr>
-              <a:t>sql</a:t>
-            </a:r>
-            <a:endParaRPr lang="en-US" dirty="0">
-              <a:latin typeface="Lato"/>
-              <a:ea typeface="Lato"/>
-              <a:cs typeface="Lato"/>
-              <a:sym typeface="Lato"/>
-            </a:endParaRPr>
-          </a:p>
-        </p:txBody>
-      </p:sp>
-      <p:sp>
-        <p:nvSpPr>
-          <p:cNvPr id="309" name="Google Shape;309;g5275e2a24e_0_238:notes"/>
-          <p:cNvSpPr>
-            <a:spLocks noGrp="1" noRot="1" noChangeAspect="1"/>
-          </p:cNvSpPr>
-          <p:nvPr>
-            <p:ph type="sldImg" idx="2"/>
-          </p:nvPr>
-        </p:nvSpPr>
-        <p:spPr>
-          <a:xfrm>
-            <a:off x="685800" y="1143000"/>
-            <a:ext cx="5486400" cy="3086100"/>
-          </a:xfrm>
-          <a:custGeom>
-            <a:avLst/>
-            <a:gdLst/>
-            <a:ahLst/>
-            <a:cxnLst/>
-            <a:rect l="l" t="t" r="r" b="b"/>
-            <a:pathLst>
-              <a:path w="120000" h="120000" extrusionOk="0">
-                <a:moveTo>
-                  <a:pt x="0" y="0"/>
-                </a:moveTo>
-                <a:lnTo>
-                  <a:pt x="120000" y="0"/>
-                </a:lnTo>
-                <a:lnTo>
-                  <a:pt x="120000" y="120000"/>
-                </a:lnTo>
-                <a:lnTo>
-                  <a:pt x="0" y="120000"/>
-                </a:lnTo>
-                <a:close/>
-              </a:path>
-            </a:pathLst>
-          </a:custGeom>
-          <a:noFill/>
-          <a:ln w="12700" cap="flat" cmpd="sng">
-            <a:solidFill>
-              <a:srgbClr val="000000"/>
-            </a:solidFill>
-            <a:prstDash val="solid"/>
-            <a:round/>
-            <a:headEnd type="none" w="sm" len="sm"/>
-            <a:tailEnd type="none" w="sm" len="sm"/>
-          </a:ln>
-        </p:spPr>
       </p:sp>
     </p:spTree>
   </p:cSld>
@@ -25615,73 +25615,6 @@
   <p:cSld>
     <p:spTree>
       <p:nvGrpSpPr>
-        <p:cNvPr id="1" name="Shape 296"/>
-        <p:cNvGrpSpPr/>
-        <p:nvPr/>
-      </p:nvGrpSpPr>
-      <p:grpSpPr>
-        <a:xfrm>
-          <a:off x="0" y="0"/>
-          <a:ext cx="0" cy="0"/>
-          <a:chOff x="0" y="0"/>
-          <a:chExt cx="0" cy="0"/>
-        </a:xfrm>
-      </p:grpSpPr>
-      <p:sp>
-        <p:nvSpPr>
-          <p:cNvPr id="297" name="Google Shape;297;p43"/>
-          <p:cNvSpPr txBox="1">
-            <a:spLocks noGrp="1"/>
-          </p:cNvSpPr>
-          <p:nvPr>
-            <p:ph type="ctrTitle"/>
-          </p:nvPr>
-        </p:nvSpPr>
-        <p:spPr>
-          <a:xfrm>
-            <a:off x="972600" y="1763275"/>
-            <a:ext cx="11801700" cy="2219700"/>
-          </a:xfrm>
-          <a:prstGeom prst="rect">
-            <a:avLst/>
-          </a:prstGeom>
-        </p:spPr>
-        <p:txBody>
-          <a:bodyPr spcFirstLastPara="1" wrap="square" lIns="121900" tIns="121900" rIns="121900" bIns="121900" anchor="t" anchorCtr="0">
-            <a:noAutofit/>
-          </a:bodyPr>
-          <a:lstStyle/>
-          <a:p>
-            <a:pPr marL="0" lvl="0" indent="0" algn="l" rtl="0">
-              <a:spcBef>
-                <a:spcPts val="0"/>
-              </a:spcBef>
-              <a:spcAft>
-                <a:spcPts val="0"/>
-              </a:spcAft>
-              <a:buNone/>
-            </a:pPr>
-            <a:r>
-              <a:rPr lang="en-US"/>
-              <a:t>Thank you!</a:t>
-            </a:r>
-            <a:endParaRPr/>
-          </a:p>
-        </p:txBody>
-      </p:sp>
-    </p:spTree>
-  </p:cSld>
-  <p:clrMapOvr>
-    <a:masterClrMapping/>
-  </p:clrMapOvr>
-</p:sld>
-</file>
-
-<file path=ppt/slides/slide16.xml><?xml version="1.0" encoding="utf-8"?>
-<p:sld xmlns:a="http://schemas.openxmlformats.org/drawingml/2006/main" xmlns:r="http://schemas.openxmlformats.org/officeDocument/2006/relationships" xmlns:p="http://schemas.openxmlformats.org/presentationml/2006/main">
-  <p:cSld>
-    <p:spTree>
-      <p:nvGrpSpPr>
         <p:cNvPr id="1" name="Shape 310"/>
         <p:cNvGrpSpPr/>
         <p:nvPr/>
@@ -26877,6 +26810,73 @@
               <a:cs typeface="Lato"/>
               <a:sym typeface="Lato"/>
             </a:endParaRPr>
+          </a:p>
+        </p:txBody>
+      </p:sp>
+    </p:spTree>
+  </p:cSld>
+  <p:clrMapOvr>
+    <a:masterClrMapping/>
+  </p:clrMapOvr>
+</p:sld>
+</file>
+
+<file path=ppt/slides/slide16.xml><?xml version="1.0" encoding="utf-8"?>
+<p:sld xmlns:a="http://schemas.openxmlformats.org/drawingml/2006/main" xmlns:r="http://schemas.openxmlformats.org/officeDocument/2006/relationships" xmlns:p="http://schemas.openxmlformats.org/presentationml/2006/main">
+  <p:cSld>
+    <p:spTree>
+      <p:nvGrpSpPr>
+        <p:cNvPr id="1" name="Shape 296"/>
+        <p:cNvGrpSpPr/>
+        <p:nvPr/>
+      </p:nvGrpSpPr>
+      <p:grpSpPr>
+        <a:xfrm>
+          <a:off x="0" y="0"/>
+          <a:ext cx="0" cy="0"/>
+          <a:chOff x="0" y="0"/>
+          <a:chExt cx="0" cy="0"/>
+        </a:xfrm>
+      </p:grpSpPr>
+      <p:sp>
+        <p:nvSpPr>
+          <p:cNvPr id="297" name="Google Shape;297;p43"/>
+          <p:cNvSpPr txBox="1">
+            <a:spLocks noGrp="1"/>
+          </p:cNvSpPr>
+          <p:nvPr>
+            <p:ph type="ctrTitle"/>
+          </p:nvPr>
+        </p:nvSpPr>
+        <p:spPr>
+          <a:xfrm>
+            <a:off x="972600" y="1763275"/>
+            <a:ext cx="11801700" cy="2219700"/>
+          </a:xfrm>
+          <a:prstGeom prst="rect">
+            <a:avLst/>
+          </a:prstGeom>
+        </p:spPr>
+        <p:txBody>
+          <a:bodyPr spcFirstLastPara="1" wrap="square" lIns="121900" tIns="121900" rIns="121900" bIns="121900" anchor="t" anchorCtr="0">
+            <a:noAutofit/>
+          </a:bodyPr>
+          <a:lstStyle/>
+          <a:p>
+            <a:pPr marL="0" lvl="0" indent="0" algn="l" rtl="0">
+              <a:spcBef>
+                <a:spcPts val="0"/>
+              </a:spcBef>
+              <a:spcAft>
+                <a:spcPts val="0"/>
+              </a:spcAft>
+              <a:buNone/>
+            </a:pPr>
+            <a:r>
+              <a:rPr lang="en-US"/>
+              <a:t>Thank you!</a:t>
+            </a:r>
+            <a:endParaRPr/>
           </a:p>
         </p:txBody>
       </p:sp>

</xml_diff>

<commit_message>
Callers-to-Coders upd - 6.25.20
Callers-to-Coders upd - 6.25.20
</commit_message>
<xml_diff>
--- a/Lectures/(8) Tools for Data Manipulation _ Management.pptx
+++ b/Lectures/(8) Tools for Data Manipulation _ Management.pptx
@@ -4177,6 +4177,32 @@
                 <a:hlinkClick r:id="rId3"/>
               </a:rPr>
               <a:t>NoSQL &amp; Hadoop Intro: https://datajobs.com/what-is-hadoop-and-nosql</a:t>
+            </a:r>
+            <a:endParaRPr lang="en-US" dirty="0"/>
+          </a:p>
+          <a:p>
+            <a:pPr marL="0" lvl="0" indent="0" algn="l" rtl="0">
+              <a:lnSpc>
+                <a:spcPct val="100000"/>
+              </a:lnSpc>
+              <a:spcBef>
+                <a:spcPts val="0"/>
+              </a:spcBef>
+              <a:spcAft>
+                <a:spcPts val="0"/>
+              </a:spcAft>
+              <a:buSzPts val="1400"/>
+              <a:buNone/>
+            </a:pPr>
+            <a:r>
+              <a:rPr lang="en-US" dirty="0"/>
+              <a:t>Comparison: </a:t>
+            </a:r>
+            <a:r>
+              <a:rPr lang="en-US" dirty="0">
+                <a:hlinkClick r:id="rId4"/>
+              </a:rPr>
+              <a:t>https://www.quora.com/What-are-the-main-differences-between-the-four-types-of-NoSql-databases-KeyValue-Store-Column-Oriented-Store-Document-Oriented-Graph-Database#:~:text=The%20only%20real%20difference%20is,the%20format%20of%20each%20value.</a:t>
             </a:r>
             <a:endParaRPr dirty="0"/>
           </a:p>
@@ -24413,11 +24439,17 @@
         <p:nvGraphicFramePr>
           <p:cNvPr id="290" name="Google Shape;290;p42"/>
           <p:cNvGraphicFramePr/>
-          <p:nvPr/>
+          <p:nvPr>
+            <p:extLst>
+              <p:ext uri="{D42A27DB-BD31-4B8C-83A1-F6EECF244321}">
+                <p14:modId xmlns:p14="http://schemas.microsoft.com/office/powerpoint/2010/main" val="2332733320"/>
+              </p:ext>
+            </p:extLst>
+          </p:nvPr>
         </p:nvGraphicFramePr>
         <p:xfrm>
-          <a:off x="373713" y="1669175"/>
-          <a:ext cx="11444550" cy="5248100"/>
+          <a:off x="457199" y="1669175"/>
+          <a:ext cx="11294532" cy="5218322"/>
         </p:xfrm>
         <a:graphic>
           <a:graphicData uri="http://schemas.openxmlformats.org/drawingml/2006/table">
@@ -24429,21 +24461,21 @@
                 <a:tableStyleId>{FA9B7535-07B7-4EA8-9E1C-266842263CEE}</a:tableStyleId>
               </a:tblPr>
               <a:tblGrid>
-                <a:gridCol w="1318675">
+                <a:gridCol w="1301389">
                   <a:extLst>
                     <a:ext uri="{9D8B030D-6E8A-4147-A177-3AD203B41FA5}">
                       <a16:colId xmlns:a16="http://schemas.microsoft.com/office/drawing/2014/main" val="20000"/>
                     </a:ext>
                   </a:extLst>
                 </a:gridCol>
-                <a:gridCol w="5673750">
+                <a:gridCol w="5599377">
                   <a:extLst>
                     <a:ext uri="{9D8B030D-6E8A-4147-A177-3AD203B41FA5}">
                       <a16:colId xmlns:a16="http://schemas.microsoft.com/office/drawing/2014/main" val="20001"/>
                     </a:ext>
                   </a:extLst>
                 </a:gridCol>
-                <a:gridCol w="4452125">
+                <a:gridCol w="4393766">
                   <a:extLst>
                     <a:ext uri="{9D8B030D-6E8A-4147-A177-3AD203B41FA5}">
                       <a16:colId xmlns:a16="http://schemas.microsoft.com/office/drawing/2014/main" val="20002"/>
@@ -24451,7 +24483,7 @@
                   </a:extLst>
                 </a:gridCol>
               </a:tblGrid>
-              <a:tr h="375975">
+              <a:tr h="378500">
                 <a:tc>
                   <a:txBody>
                     <a:bodyPr/>
@@ -24581,7 +24613,7 @@
                   </a:ext>
                 </a:extLst>
               </a:tr>
-              <a:tr h="601575">
+              <a:tr h="605600">
                 <a:tc>
                   <a:txBody>
                     <a:bodyPr/>
@@ -24721,7 +24753,7 @@
                   </a:ext>
                 </a:extLst>
               </a:tr>
-              <a:tr h="827150">
+              <a:tr h="832701">
                 <a:tc>
                   <a:txBody>
                     <a:bodyPr/>
@@ -24861,7 +24893,7 @@
                   </a:ext>
                 </a:extLst>
               </a:tr>
-              <a:tr h="601575">
+              <a:tr h="605600">
                 <a:tc>
                   <a:txBody>
                     <a:bodyPr/>
@@ -25001,7 +25033,7 @@
                   </a:ext>
                 </a:extLst>
               </a:tr>
-              <a:tr h="752300">
+              <a:tr h="722522">
                 <a:tc>
                   <a:txBody>
                     <a:bodyPr/>
@@ -25117,7 +25149,7 @@
                   </a:ext>
                 </a:extLst>
               </a:tr>
-              <a:tr h="827150">
+              <a:tr h="832701">
                 <a:tc>
                   <a:txBody>
                     <a:bodyPr/>
@@ -25257,7 +25289,7 @@
                   </a:ext>
                 </a:extLst>
               </a:tr>
-              <a:tr h="601575">
+              <a:tr h="605600">
                 <a:tc>
                   <a:txBody>
                     <a:bodyPr/>
@@ -25320,14 +25352,14 @@
                         <a:buNone/>
                       </a:pPr>
                       <a:r>
-                        <a:rPr lang="en-US" sz="1500">
+                        <a:rPr lang="en-US" sz="1500" dirty="0">
                           <a:highlight>
                             <a:srgbClr val="FFFFFF"/>
                           </a:highlight>
                         </a:rPr>
                         <a:t>A scalable, fully managed enterprise data warehouse (EDW) with SQL and fast ad-hoc queries.</a:t>
                       </a:r>
-                      <a:endParaRPr sz="1500">
+                      <a:endParaRPr sz="1500" dirty="0">
                         <a:highlight>
                           <a:srgbClr val="FFFFFF"/>
                         </a:highlight>
@@ -25397,7 +25429,7 @@
                   </a:ext>
                 </a:extLst>
               </a:tr>
-              <a:tr h="601575">
+              <a:tr h="605600">
                 <a:tc>
                   <a:txBody>
                     <a:bodyPr/>
@@ -25491,14 +25523,14 @@
                         <a:buNone/>
                       </a:pPr>
                       <a:r>
-                        <a:rPr lang="en-US" sz="1500">
+                        <a:rPr lang="en-US" sz="1500" dirty="0">
                           <a:highlight>
                             <a:srgbClr val="FFFFFF"/>
                           </a:highlight>
                         </a:rPr>
                         <a:t>End-user interaction with docs and files</a:t>
                       </a:r>
-                      <a:endParaRPr sz="1500">
+                      <a:endParaRPr sz="1500" dirty="0">
                         <a:highlight>
                           <a:srgbClr val="FFFFFF"/>
                         </a:highlight>
@@ -25515,14 +25547,14 @@
                         <a:buNone/>
                       </a:pPr>
                       <a:r>
-                        <a:rPr lang="en-US" sz="1500">
+                        <a:rPr lang="en-US" sz="1500" dirty="0">
                           <a:highlight>
                             <a:srgbClr val="FFFFFF"/>
                           </a:highlight>
                         </a:rPr>
                         <a:t>Collaborative creation and editing, Syncing files</a:t>
                       </a:r>
-                      <a:endParaRPr sz="1500">
+                      <a:endParaRPr sz="1500" dirty="0">
                         <a:highlight>
                           <a:srgbClr val="FFFFFF"/>
                         </a:highlight>
@@ -28231,11 +28263,11 @@
             </a:r>
             <a:r>
               <a:rPr lang="en-US" sz="1800" dirty="0"/>
-              <a:t> and Big </a:t>
+              <a:t> and </a:t>
             </a:r>
             <a:r>
               <a:rPr lang="en-US" sz="1800" u="sng" dirty="0"/>
-              <a:t>Data</a:t>
+              <a:t>Big Data</a:t>
             </a:r>
             <a:r>
               <a:rPr lang="en-US" sz="1800" dirty="0"/>
@@ -28359,7 +28391,7 @@
             </a:pPr>
             <a:r>
               <a:rPr lang="en-US" sz="1800" dirty="0"/>
-              <a:t>It has many integrations that support systems that are databases, cloud based software, and many file formats.</a:t>
+              <a:t>It has many integrations that support systems that are databases, cloud-based software, and many file formats.</a:t>
             </a:r>
             <a:endParaRPr sz="1800" dirty="0"/>
           </a:p>
@@ -29961,7 +29993,7 @@
         </p:blipFill>
         <p:spPr>
           <a:xfrm>
-            <a:off x="5617555" y="3089078"/>
+            <a:off x="5524120" y="2961044"/>
             <a:ext cx="5743575" cy="3429000"/>
           </a:xfrm>
           <a:prstGeom prst="rect">

</xml_diff>